<commit_message>
Interface + liste note. Arret sur l'affichage img
</commit_message>
<xml_diff>
--- a/Documentation/03a_Zoning.pptx
+++ b/Documentation/03a_Zoning.pptx
@@ -115,6 +115,14 @@
       </a:defRPr>
     </a:lvl9pPr>
   </p:defaultTextStyle>
+  <p:extLst>
+    <p:ext uri="{EFAFB233-063F-42B5-8137-9DF3F51BA10A}">
+      <p15:sldGuideLst xmlns:p15="http://schemas.microsoft.com/office/powerpoint/2012/main"/>
+    </p:ext>
+    <p:ext uri="{2D200454-40CA-4A62-9FC3-DE9A4176ACB9}">
+      <p15:notesGuideLst xmlns:p15="http://schemas.microsoft.com/office/powerpoint/2012/main"/>
+    </p:ext>
+  </p:extLst>
 </p:presentation>
 </file>
 
@@ -2683,7 +2691,7 @@
           <a:p>
             <a:fld id="{5B2A7610-8FD3-4BC7-987D-8ECE75EA7EA6}" type="datetimeFigureOut">
               <a:rPr lang="fr-FR" smtClean="0"/>
-              <a:t>10/01/2020</a:t>
+              <a:t>30/01/2020</a:t>
             </a:fld>
             <a:endParaRPr lang="fr-FR"/>
           </a:p>
@@ -3170,7 +3178,7 @@
           <a:p>
             <a:fld id="{E1F7F654-7AD0-4089-BE10-3104CFBB443D}" type="datetimeFigureOut">
               <a:rPr lang="fr-FR" smtClean="0"/>
-              <a:t>10/01/2020</a:t>
+              <a:t>30/01/2020</a:t>
             </a:fld>
             <a:endParaRPr lang="fr-FR"/>
           </a:p>
@@ -3340,7 +3348,7 @@
           <a:p>
             <a:fld id="{E1F7F654-7AD0-4089-BE10-3104CFBB443D}" type="datetimeFigureOut">
               <a:rPr lang="fr-FR" smtClean="0"/>
-              <a:t>10/01/2020</a:t>
+              <a:t>30/01/2020</a:t>
             </a:fld>
             <a:endParaRPr lang="fr-FR"/>
           </a:p>
@@ -3520,7 +3528,7 @@
           <a:p>
             <a:fld id="{E1F7F654-7AD0-4089-BE10-3104CFBB443D}" type="datetimeFigureOut">
               <a:rPr lang="fr-FR" smtClean="0"/>
-              <a:t>10/01/2020</a:t>
+              <a:t>30/01/2020</a:t>
             </a:fld>
             <a:endParaRPr lang="fr-FR"/>
           </a:p>
@@ -3690,7 +3698,7 @@
           <a:p>
             <a:fld id="{E1F7F654-7AD0-4089-BE10-3104CFBB443D}" type="datetimeFigureOut">
               <a:rPr lang="fr-FR" smtClean="0"/>
-              <a:t>10/01/2020</a:t>
+              <a:t>30/01/2020</a:t>
             </a:fld>
             <a:endParaRPr lang="fr-FR"/>
           </a:p>
@@ -3934,7 +3942,7 @@
           <a:p>
             <a:fld id="{E1F7F654-7AD0-4089-BE10-3104CFBB443D}" type="datetimeFigureOut">
               <a:rPr lang="fr-FR" smtClean="0"/>
-              <a:t>10/01/2020</a:t>
+              <a:t>30/01/2020</a:t>
             </a:fld>
             <a:endParaRPr lang="fr-FR"/>
           </a:p>
@@ -4166,7 +4174,7 @@
           <a:p>
             <a:fld id="{E1F7F654-7AD0-4089-BE10-3104CFBB443D}" type="datetimeFigureOut">
               <a:rPr lang="fr-FR" smtClean="0"/>
-              <a:t>10/01/2020</a:t>
+              <a:t>30/01/2020</a:t>
             </a:fld>
             <a:endParaRPr lang="fr-FR"/>
           </a:p>
@@ -4533,7 +4541,7 @@
           <a:p>
             <a:fld id="{E1F7F654-7AD0-4089-BE10-3104CFBB443D}" type="datetimeFigureOut">
               <a:rPr lang="fr-FR" smtClean="0"/>
-              <a:t>10/01/2020</a:t>
+              <a:t>30/01/2020</a:t>
             </a:fld>
             <a:endParaRPr lang="fr-FR"/>
           </a:p>
@@ -4651,7 +4659,7 @@
           <a:p>
             <a:fld id="{E1F7F654-7AD0-4089-BE10-3104CFBB443D}" type="datetimeFigureOut">
               <a:rPr lang="fr-FR" smtClean="0"/>
-              <a:t>10/01/2020</a:t>
+              <a:t>30/01/2020</a:t>
             </a:fld>
             <a:endParaRPr lang="fr-FR"/>
           </a:p>
@@ -4746,7 +4754,7 @@
           <a:p>
             <a:fld id="{E1F7F654-7AD0-4089-BE10-3104CFBB443D}" type="datetimeFigureOut">
               <a:rPr lang="fr-FR" smtClean="0"/>
-              <a:t>10/01/2020</a:t>
+              <a:t>30/01/2020</a:t>
             </a:fld>
             <a:endParaRPr lang="fr-FR"/>
           </a:p>
@@ -5023,7 +5031,7 @@
           <a:p>
             <a:fld id="{E1F7F654-7AD0-4089-BE10-3104CFBB443D}" type="datetimeFigureOut">
               <a:rPr lang="fr-FR" smtClean="0"/>
-              <a:t>10/01/2020</a:t>
+              <a:t>30/01/2020</a:t>
             </a:fld>
             <a:endParaRPr lang="fr-FR"/>
           </a:p>
@@ -5280,7 +5288,7 @@
           <a:p>
             <a:fld id="{E1F7F654-7AD0-4089-BE10-3104CFBB443D}" type="datetimeFigureOut">
               <a:rPr lang="fr-FR" smtClean="0"/>
-              <a:t>10/01/2020</a:t>
+              <a:t>30/01/2020</a:t>
             </a:fld>
             <a:endParaRPr lang="fr-FR"/>
           </a:p>
@@ -5493,7 +5501,7 @@
           <a:p>
             <a:fld id="{E1F7F654-7AD0-4089-BE10-3104CFBB443D}" type="datetimeFigureOut">
               <a:rPr lang="fr-FR" smtClean="0"/>
-              <a:t>10/01/2020</a:t>
+              <a:t>30/01/2020</a:t>
             </a:fld>
             <a:endParaRPr lang="fr-FR"/>
           </a:p>

</xml_diff>